<commit_message>
ch02 stock & ch03 sql_basic
</commit_message>
<xml_diff>
--- a/소프트웨어코딩(v2022)-자바심화/6강/35_임현덕_20220420.pptx
+++ b/소프트웨어코딩(v2022)-자바심화/6강/35_임현덕_20220420.pptx
@@ -266,7 +266,7 @@
           <a:p>
             <a:fld id="{758A65FC-B6D5-427D-933B-F89B29E43566}" type="datetimeFigureOut">
               <a:rPr lang="ko-KR" altLang="en-US" smtClean="0"/>
-              <a:t>2022-04-20</a:t>
+              <a:t>2022-05-10</a:t>
             </a:fld>
             <a:endParaRPr lang="ko-KR" altLang="en-US"/>
           </a:p>
@@ -436,7 +436,7 @@
           <a:p>
             <a:fld id="{758A65FC-B6D5-427D-933B-F89B29E43566}" type="datetimeFigureOut">
               <a:rPr lang="ko-KR" altLang="en-US" smtClean="0"/>
-              <a:t>2022-04-20</a:t>
+              <a:t>2022-05-10</a:t>
             </a:fld>
             <a:endParaRPr lang="ko-KR" altLang="en-US"/>
           </a:p>
@@ -616,7 +616,7 @@
           <a:p>
             <a:fld id="{758A65FC-B6D5-427D-933B-F89B29E43566}" type="datetimeFigureOut">
               <a:rPr lang="ko-KR" altLang="en-US" smtClean="0"/>
-              <a:t>2022-04-20</a:t>
+              <a:t>2022-05-10</a:t>
             </a:fld>
             <a:endParaRPr lang="ko-KR" altLang="en-US"/>
           </a:p>
@@ -786,7 +786,7 @@
           <a:p>
             <a:fld id="{758A65FC-B6D5-427D-933B-F89B29E43566}" type="datetimeFigureOut">
               <a:rPr lang="ko-KR" altLang="en-US" smtClean="0"/>
-              <a:t>2022-04-20</a:t>
+              <a:t>2022-05-10</a:t>
             </a:fld>
             <a:endParaRPr lang="ko-KR" altLang="en-US"/>
           </a:p>
@@ -1032,7 +1032,7 @@
           <a:p>
             <a:fld id="{758A65FC-B6D5-427D-933B-F89B29E43566}" type="datetimeFigureOut">
               <a:rPr lang="ko-KR" altLang="en-US" smtClean="0"/>
-              <a:t>2022-04-20</a:t>
+              <a:t>2022-05-10</a:t>
             </a:fld>
             <a:endParaRPr lang="ko-KR" altLang="en-US"/>
           </a:p>
@@ -1264,7 +1264,7 @@
           <a:p>
             <a:fld id="{758A65FC-B6D5-427D-933B-F89B29E43566}" type="datetimeFigureOut">
               <a:rPr lang="ko-KR" altLang="en-US" smtClean="0"/>
-              <a:t>2022-04-20</a:t>
+              <a:t>2022-05-10</a:t>
             </a:fld>
             <a:endParaRPr lang="ko-KR" altLang="en-US"/>
           </a:p>
@@ -1631,7 +1631,7 @@
           <a:p>
             <a:fld id="{758A65FC-B6D5-427D-933B-F89B29E43566}" type="datetimeFigureOut">
               <a:rPr lang="ko-KR" altLang="en-US" smtClean="0"/>
-              <a:t>2022-04-20</a:t>
+              <a:t>2022-05-10</a:t>
             </a:fld>
             <a:endParaRPr lang="ko-KR" altLang="en-US"/>
           </a:p>
@@ -1749,7 +1749,7 @@
           <a:p>
             <a:fld id="{758A65FC-B6D5-427D-933B-F89B29E43566}" type="datetimeFigureOut">
               <a:rPr lang="ko-KR" altLang="en-US" smtClean="0"/>
-              <a:t>2022-04-20</a:t>
+              <a:t>2022-05-10</a:t>
             </a:fld>
             <a:endParaRPr lang="ko-KR" altLang="en-US"/>
           </a:p>
@@ -1844,7 +1844,7 @@
           <a:p>
             <a:fld id="{758A65FC-B6D5-427D-933B-F89B29E43566}" type="datetimeFigureOut">
               <a:rPr lang="ko-KR" altLang="en-US" smtClean="0"/>
-              <a:t>2022-04-20</a:t>
+              <a:t>2022-05-10</a:t>
             </a:fld>
             <a:endParaRPr lang="ko-KR" altLang="en-US"/>
           </a:p>
@@ -2121,7 +2121,7 @@
           <a:p>
             <a:fld id="{758A65FC-B6D5-427D-933B-F89B29E43566}" type="datetimeFigureOut">
               <a:rPr lang="ko-KR" altLang="en-US" smtClean="0"/>
-              <a:t>2022-04-20</a:t>
+              <a:t>2022-05-10</a:t>
             </a:fld>
             <a:endParaRPr lang="ko-KR" altLang="en-US"/>
           </a:p>
@@ -2374,7 +2374,7 @@
           <a:p>
             <a:fld id="{758A65FC-B6D5-427D-933B-F89B29E43566}" type="datetimeFigureOut">
               <a:rPr lang="ko-KR" altLang="en-US" smtClean="0"/>
-              <a:t>2022-04-20</a:t>
+              <a:t>2022-05-10</a:t>
             </a:fld>
             <a:endParaRPr lang="ko-KR" altLang="en-US"/>
           </a:p>
@@ -2587,7 +2587,7 @@
           <a:p>
             <a:fld id="{758A65FC-B6D5-427D-933B-F89B29E43566}" type="datetimeFigureOut">
               <a:rPr lang="ko-KR" altLang="en-US" smtClean="0"/>
-              <a:t>2022-04-20</a:t>
+              <a:t>2022-05-10</a:t>
             </a:fld>
             <a:endParaRPr lang="ko-KR" altLang="en-US"/>
           </a:p>

</xml_diff>